<commit_message>
detalhezinhos arrumados closes #10
</commit_message>
<xml_diff>
--- a/1º semestre/Revisões by danny/Revisão de  algoritmos.pptx
+++ b/1º semestre/Revisões by danny/Revisão de  algoritmos.pptx
@@ -2368,9 +2368,37 @@
 <p:sldMaster xmlns:a="http://schemas.openxmlformats.org/drawingml/2006/main" xmlns:r="http://schemas.openxmlformats.org/officeDocument/2006/relationships" xmlns:p="http://schemas.openxmlformats.org/presentationml/2006/main">
   <p:cSld>
     <p:bg>
-      <p:bgRef idx="1003">
-        <a:schemeClr val="bg1"/>
-      </p:bgRef>
+      <p:bgPr>
+        <a:gradFill flip="none" rotWithShape="1">
+          <a:gsLst>
+            <a:gs pos="0">
+              <a:schemeClr val="bg1">
+                <a:tint val="93000"/>
+                <a:satMod val="150000"/>
+                <a:shade val="98000"/>
+                <a:lumMod val="102000"/>
+              </a:schemeClr>
+            </a:gs>
+            <a:gs pos="50000">
+              <a:schemeClr val="bg1">
+                <a:tint val="98000"/>
+                <a:satMod val="130000"/>
+                <a:shade val="90000"/>
+                <a:lumMod val="103000"/>
+              </a:schemeClr>
+            </a:gs>
+            <a:gs pos="100000">
+              <a:schemeClr val="bg1">
+                <a:shade val="63000"/>
+                <a:satMod val="120000"/>
+              </a:schemeClr>
+            </a:gs>
+          </a:gsLst>
+          <a:lin ang="2700000" scaled="1"/>
+          <a:tileRect/>
+        </a:gradFill>
+        <a:effectLst/>
+      </p:bgPr>
     </p:bg>
     <p:spTree>
       <p:nvGrpSpPr>
@@ -2949,7 +2977,7 @@
             </a:pPr>
             <a:r>
               <a:rPr lang="pt-BR" dirty="0"/>
-              <a:t>algoritmo 'idade'</a:t>
+              <a:t>Algoritmo 'idade'</a:t>
             </a:r>
           </a:p>
           <a:p>
@@ -3112,7 +3140,7 @@
             </a:pPr>
             <a:r>
               <a:rPr lang="pt-BR" dirty="0"/>
-              <a:t>algoritmo 'soma e subtração'</a:t>
+              <a:t>Algoritmo 'soma e subtração'</a:t>
             </a:r>
           </a:p>
           <a:p>
@@ -3206,7 +3234,7 @@
             </a:pPr>
             <a:r>
               <a:rPr lang="pt-BR" dirty="0"/>
-              <a:t>		resultado &lt;- numero1 + numero2</a:t>
+              <a:t>		resultado     numero1 + numero2</a:t>
             </a:r>
           </a:p>
           <a:p>
@@ -3224,7 +3252,7 @@
             </a:pPr>
             <a:r>
               <a:rPr lang="pt-BR" dirty="0"/>
-              <a:t>		resultado &lt;- numero1 - numero2</a:t>
+              <a:t>		resultado     numero1 - numero2</a:t>
             </a:r>
           </a:p>
           <a:p>
@@ -3279,6 +3307,116 @@
           </a:p>
           <a:p>
             <a:endParaRPr lang="pt-BR" dirty="0"/>
+          </a:p>
+        </p:txBody>
+      </p:sp>
+      <p:sp>
+        <p:nvSpPr>
+          <p:cNvPr id="4" name="Seta: para a Esquerda 3">
+            <a:extLst>
+              <a:ext uri="{FF2B5EF4-FFF2-40B4-BE49-F238E27FC236}">
+                <a16:creationId xmlns:a16="http://schemas.microsoft.com/office/drawing/2014/main" id="{740C45AA-D60E-471A-B615-8C95F1346F79}"/>
+              </a:ext>
+            </a:extLst>
+          </p:cNvPr>
+          <p:cNvSpPr/>
+          <p:nvPr/>
+        </p:nvSpPr>
+        <p:spPr>
+          <a:xfrm>
+            <a:off x="4009293" y="3854548"/>
+            <a:ext cx="295421" cy="126608"/>
+          </a:xfrm>
+          <a:prstGeom prst="leftArrow">
+            <a:avLst/>
+          </a:prstGeom>
+          <a:solidFill>
+            <a:schemeClr val="tx1"/>
+          </a:solidFill>
+        </p:spPr>
+        <p:style>
+          <a:lnRef idx="2">
+            <a:schemeClr val="accent1">
+              <a:shade val="50000"/>
+            </a:schemeClr>
+          </a:lnRef>
+          <a:fillRef idx="1">
+            <a:schemeClr val="accent1"/>
+          </a:fillRef>
+          <a:effectRef idx="0">
+            <a:schemeClr val="accent1"/>
+          </a:effectRef>
+          <a:fontRef idx="minor">
+            <a:schemeClr val="lt1"/>
+          </a:fontRef>
+        </p:style>
+        <p:txBody>
+          <a:bodyPr rtlCol="0" anchor="ctr"/>
+          <a:lstStyle/>
+          <a:p>
+            <a:pPr algn="ctr"/>
+            <a:endParaRPr lang="pt-BR">
+              <a:solidFill>
+                <a:schemeClr val="tx2">
+                  <a:lumMod val="75000"/>
+                </a:schemeClr>
+              </a:solidFill>
+            </a:endParaRPr>
+          </a:p>
+        </p:txBody>
+      </p:sp>
+      <p:sp>
+        <p:nvSpPr>
+          <p:cNvPr id="5" name="Seta: para a Esquerda 4">
+            <a:extLst>
+              <a:ext uri="{FF2B5EF4-FFF2-40B4-BE49-F238E27FC236}">
+                <a16:creationId xmlns:a16="http://schemas.microsoft.com/office/drawing/2014/main" id="{B7243C5C-412A-4729-8BE6-7A651727625C}"/>
+              </a:ext>
+            </a:extLst>
+          </p:cNvPr>
+          <p:cNvSpPr/>
+          <p:nvPr/>
+        </p:nvSpPr>
+        <p:spPr>
+          <a:xfrm>
+            <a:off x="4009293" y="4572000"/>
+            <a:ext cx="295421" cy="126608"/>
+          </a:xfrm>
+          <a:prstGeom prst="leftArrow">
+            <a:avLst/>
+          </a:prstGeom>
+          <a:solidFill>
+            <a:schemeClr val="tx1"/>
+          </a:solidFill>
+        </p:spPr>
+        <p:style>
+          <a:lnRef idx="2">
+            <a:schemeClr val="accent1">
+              <a:shade val="50000"/>
+            </a:schemeClr>
+          </a:lnRef>
+          <a:fillRef idx="1">
+            <a:schemeClr val="accent1"/>
+          </a:fillRef>
+          <a:effectRef idx="0">
+            <a:schemeClr val="accent1"/>
+          </a:effectRef>
+          <a:fontRef idx="minor">
+            <a:schemeClr val="lt1"/>
+          </a:fontRef>
+        </p:style>
+        <p:txBody>
+          <a:bodyPr rtlCol="0" anchor="ctr"/>
+          <a:lstStyle/>
+          <a:p>
+            <a:pPr algn="ctr"/>
+            <a:endParaRPr lang="pt-BR">
+              <a:solidFill>
+                <a:schemeClr val="tx2">
+                  <a:lumMod val="75000"/>
+                </a:schemeClr>
+              </a:solidFill>
+            </a:endParaRPr>
           </a:p>
         </p:txBody>
       </p:sp>
@@ -3470,7 +3608,7 @@
             </a:pPr>
             <a:r>
               <a:rPr lang="pt-BR" dirty="0"/>
-              <a:t>algoritmo "homem ou mulher"</a:t>
+              <a:t>Algoritmo "homem ou mulher"</a:t>
             </a:r>
           </a:p>
           <a:p>
@@ -3806,7 +3944,7 @@
             </a:pPr>
             <a:r>
               <a:rPr lang="pt-BR" dirty="0"/>
-              <a:t>Num &lt;- 0</a:t>
+              <a:t>Num      0</a:t>
             </a:r>
           </a:p>
           <a:p>
@@ -3846,7 +3984,7 @@
             </a:r>
             <a:r>
               <a:rPr lang="pt-BR" dirty="0"/>
-              <a:t> &lt;- cont+1</a:t>
+              <a:t>      cont+1</a:t>
             </a:r>
           </a:p>
           <a:p>
@@ -3881,16 +4019,16 @@
             </a:pPr>
             <a:r>
               <a:rPr lang="pt-BR" dirty="0"/>
-              <a:t>Maior &lt;- num</a:t>
-            </a:r>
-          </a:p>
-          <a:p>
-            <a:pPr marL="0" indent="0">
-              <a:buNone/>
-            </a:pPr>
-            <a:r>
-              <a:rPr lang="pt-BR" dirty="0"/>
-              <a:t>Menor &lt;- num</a:t>
+              <a:t>Maior       num</a:t>
+            </a:r>
+          </a:p>
+          <a:p>
+            <a:pPr marL="0" indent="0">
+              <a:buNone/>
+            </a:pPr>
+            <a:r>
+              <a:rPr lang="pt-BR" dirty="0"/>
+              <a:t>Menor      num</a:t>
             </a:r>
           </a:p>
           <a:p>
@@ -3917,7 +4055,7 @@
             </a:pPr>
             <a:r>
               <a:rPr lang="pt-BR" dirty="0"/>
-              <a:t>Maior &lt;- num</a:t>
+              <a:t>Maior      num</a:t>
             </a:r>
           </a:p>
           <a:p>
@@ -3945,7 +4083,7 @@
             </a:pPr>
             <a:r>
               <a:rPr lang="pt-BR" dirty="0"/>
-              <a:t>Menor &lt;- num</a:t>
+              <a:t>Menor      num</a:t>
             </a:r>
           </a:p>
           <a:p>
@@ -3994,6 +4132,336 @@
               <a:rPr lang="pt-BR" dirty="0"/>
               <a:t>fim</a:t>
             </a:r>
+          </a:p>
+        </p:txBody>
+      </p:sp>
+      <p:sp>
+        <p:nvSpPr>
+          <p:cNvPr id="4" name="Seta: para a Esquerda 3">
+            <a:extLst>
+              <a:ext uri="{FF2B5EF4-FFF2-40B4-BE49-F238E27FC236}">
+                <a16:creationId xmlns:a16="http://schemas.microsoft.com/office/drawing/2014/main" id="{DDB64B77-958D-4AC9-A8F8-C61B6751BBE8}"/>
+              </a:ext>
+            </a:extLst>
+          </p:cNvPr>
+          <p:cNvSpPr/>
+          <p:nvPr/>
+        </p:nvSpPr>
+        <p:spPr>
+          <a:xfrm>
+            <a:off x="786327" y="2961982"/>
+            <a:ext cx="197924" cy="108243"/>
+          </a:xfrm>
+          <a:prstGeom prst="leftArrow">
+            <a:avLst/>
+          </a:prstGeom>
+          <a:solidFill>
+            <a:schemeClr val="tx1"/>
+          </a:solidFill>
+        </p:spPr>
+        <p:style>
+          <a:lnRef idx="2">
+            <a:schemeClr val="accent1">
+              <a:shade val="50000"/>
+            </a:schemeClr>
+          </a:lnRef>
+          <a:fillRef idx="1">
+            <a:schemeClr val="accent1"/>
+          </a:fillRef>
+          <a:effectRef idx="0">
+            <a:schemeClr val="accent1"/>
+          </a:effectRef>
+          <a:fontRef idx="minor">
+            <a:schemeClr val="lt1"/>
+          </a:fontRef>
+        </p:style>
+        <p:txBody>
+          <a:bodyPr rtlCol="0" anchor="ctr"/>
+          <a:lstStyle/>
+          <a:p>
+            <a:pPr algn="ctr"/>
+            <a:endParaRPr lang="pt-BR">
+              <a:solidFill>
+                <a:schemeClr val="tx2">
+                  <a:lumMod val="75000"/>
+                </a:schemeClr>
+              </a:solidFill>
+            </a:endParaRPr>
+          </a:p>
+        </p:txBody>
+      </p:sp>
+      <p:sp>
+        <p:nvSpPr>
+          <p:cNvPr id="5" name="Seta: para a Esquerda 4">
+            <a:extLst>
+              <a:ext uri="{FF2B5EF4-FFF2-40B4-BE49-F238E27FC236}">
+                <a16:creationId xmlns:a16="http://schemas.microsoft.com/office/drawing/2014/main" id="{5ED7BE56-4E71-4362-9934-C4C03888ED92}"/>
+              </a:ext>
+            </a:extLst>
+          </p:cNvPr>
+          <p:cNvSpPr/>
+          <p:nvPr/>
+        </p:nvSpPr>
+        <p:spPr>
+          <a:xfrm>
+            <a:off x="809187" y="3232688"/>
+            <a:ext cx="197924" cy="108243"/>
+          </a:xfrm>
+          <a:prstGeom prst="leftArrow">
+            <a:avLst/>
+          </a:prstGeom>
+          <a:solidFill>
+            <a:schemeClr val="tx1"/>
+          </a:solidFill>
+        </p:spPr>
+        <p:style>
+          <a:lnRef idx="2">
+            <a:schemeClr val="accent1">
+              <a:shade val="50000"/>
+            </a:schemeClr>
+          </a:lnRef>
+          <a:fillRef idx="1">
+            <a:schemeClr val="accent1"/>
+          </a:fillRef>
+          <a:effectRef idx="0">
+            <a:schemeClr val="accent1"/>
+          </a:effectRef>
+          <a:fontRef idx="minor">
+            <a:schemeClr val="lt1"/>
+          </a:fontRef>
+        </p:style>
+        <p:txBody>
+          <a:bodyPr rtlCol="0" anchor="ctr"/>
+          <a:lstStyle/>
+          <a:p>
+            <a:pPr algn="ctr"/>
+            <a:endParaRPr lang="pt-BR">
+              <a:solidFill>
+                <a:schemeClr val="tx2">
+                  <a:lumMod val="75000"/>
+                </a:schemeClr>
+              </a:solidFill>
+            </a:endParaRPr>
+          </a:p>
+        </p:txBody>
+      </p:sp>
+      <p:sp>
+        <p:nvSpPr>
+          <p:cNvPr id="7" name="Seta: para a Esquerda 6">
+            <a:extLst>
+              <a:ext uri="{FF2B5EF4-FFF2-40B4-BE49-F238E27FC236}">
+                <a16:creationId xmlns:a16="http://schemas.microsoft.com/office/drawing/2014/main" id="{3B6FF9AD-7A1F-42CF-9598-BF13E2EC277D}"/>
+              </a:ext>
+            </a:extLst>
+          </p:cNvPr>
+          <p:cNvSpPr/>
+          <p:nvPr/>
+        </p:nvSpPr>
+        <p:spPr>
+          <a:xfrm>
+            <a:off x="687365" y="1079842"/>
+            <a:ext cx="197924" cy="108243"/>
+          </a:xfrm>
+          <a:prstGeom prst="leftArrow">
+            <a:avLst/>
+          </a:prstGeom>
+          <a:solidFill>
+            <a:schemeClr val="tx1"/>
+          </a:solidFill>
+        </p:spPr>
+        <p:style>
+          <a:lnRef idx="2">
+            <a:schemeClr val="accent1">
+              <a:shade val="50000"/>
+            </a:schemeClr>
+          </a:lnRef>
+          <a:fillRef idx="1">
+            <a:schemeClr val="accent1"/>
+          </a:fillRef>
+          <a:effectRef idx="0">
+            <a:schemeClr val="accent1"/>
+          </a:effectRef>
+          <a:fontRef idx="minor">
+            <a:schemeClr val="lt1"/>
+          </a:fontRef>
+        </p:style>
+        <p:txBody>
+          <a:bodyPr rtlCol="0" anchor="ctr"/>
+          <a:lstStyle/>
+          <a:p>
+            <a:pPr algn="ctr"/>
+            <a:endParaRPr lang="pt-BR">
+              <a:solidFill>
+                <a:schemeClr val="tx2">
+                  <a:lumMod val="75000"/>
+                </a:schemeClr>
+              </a:solidFill>
+            </a:endParaRPr>
+          </a:p>
+        </p:txBody>
+      </p:sp>
+      <p:sp>
+        <p:nvSpPr>
+          <p:cNvPr id="8" name="Seta: para a Esquerda 7">
+            <a:extLst>
+              <a:ext uri="{FF2B5EF4-FFF2-40B4-BE49-F238E27FC236}">
+                <a16:creationId xmlns:a16="http://schemas.microsoft.com/office/drawing/2014/main" id="{6C7D43DE-B6A5-4389-985E-16DD55BF71CD}"/>
+              </a:ext>
+            </a:extLst>
+          </p:cNvPr>
+          <p:cNvSpPr/>
+          <p:nvPr/>
+        </p:nvSpPr>
+        <p:spPr>
+          <a:xfrm>
+            <a:off x="687365" y="2163885"/>
+            <a:ext cx="197924" cy="108243"/>
+          </a:xfrm>
+          <a:prstGeom prst="leftArrow">
+            <a:avLst/>
+          </a:prstGeom>
+          <a:solidFill>
+            <a:schemeClr val="tx1"/>
+          </a:solidFill>
+        </p:spPr>
+        <p:style>
+          <a:lnRef idx="2">
+            <a:schemeClr val="accent1">
+              <a:shade val="50000"/>
+            </a:schemeClr>
+          </a:lnRef>
+          <a:fillRef idx="1">
+            <a:schemeClr val="accent1"/>
+          </a:fillRef>
+          <a:effectRef idx="0">
+            <a:schemeClr val="accent1"/>
+          </a:effectRef>
+          <a:fontRef idx="minor">
+            <a:schemeClr val="lt1"/>
+          </a:fontRef>
+        </p:style>
+        <p:txBody>
+          <a:bodyPr rtlCol="0" anchor="ctr"/>
+          <a:lstStyle/>
+          <a:p>
+            <a:pPr algn="ctr"/>
+            <a:endParaRPr lang="pt-BR">
+              <a:solidFill>
+                <a:schemeClr val="tx2">
+                  <a:lumMod val="75000"/>
+                </a:schemeClr>
+              </a:solidFill>
+            </a:endParaRPr>
+          </a:p>
+        </p:txBody>
+      </p:sp>
+      <p:sp>
+        <p:nvSpPr>
+          <p:cNvPr id="9" name="Seta: para a Esquerda 8">
+            <a:extLst>
+              <a:ext uri="{FF2B5EF4-FFF2-40B4-BE49-F238E27FC236}">
+                <a16:creationId xmlns:a16="http://schemas.microsoft.com/office/drawing/2014/main" id="{26A1B9C1-15D0-449E-8FB0-8B7C6E360203}"/>
+              </a:ext>
+            </a:extLst>
+          </p:cNvPr>
+          <p:cNvSpPr/>
+          <p:nvPr/>
+        </p:nvSpPr>
+        <p:spPr>
+          <a:xfrm>
+            <a:off x="786327" y="4030785"/>
+            <a:ext cx="197924" cy="108243"/>
+          </a:xfrm>
+          <a:prstGeom prst="leftArrow">
+            <a:avLst/>
+          </a:prstGeom>
+          <a:solidFill>
+            <a:schemeClr val="tx1"/>
+          </a:solidFill>
+        </p:spPr>
+        <p:style>
+          <a:lnRef idx="2">
+            <a:schemeClr val="accent1">
+              <a:shade val="50000"/>
+            </a:schemeClr>
+          </a:lnRef>
+          <a:fillRef idx="1">
+            <a:schemeClr val="accent1"/>
+          </a:fillRef>
+          <a:effectRef idx="0">
+            <a:schemeClr val="accent1"/>
+          </a:effectRef>
+          <a:fontRef idx="minor">
+            <a:schemeClr val="lt1"/>
+          </a:fontRef>
+        </p:style>
+        <p:txBody>
+          <a:bodyPr rtlCol="0" anchor="ctr"/>
+          <a:lstStyle/>
+          <a:p>
+            <a:pPr algn="ctr"/>
+            <a:endParaRPr lang="pt-BR">
+              <a:solidFill>
+                <a:schemeClr val="tx2">
+                  <a:lumMod val="75000"/>
+                </a:schemeClr>
+              </a:solidFill>
+            </a:endParaRPr>
+          </a:p>
+        </p:txBody>
+      </p:sp>
+      <p:sp>
+        <p:nvSpPr>
+          <p:cNvPr id="10" name="Seta: para a Esquerda 9">
+            <a:extLst>
+              <a:ext uri="{FF2B5EF4-FFF2-40B4-BE49-F238E27FC236}">
+                <a16:creationId xmlns:a16="http://schemas.microsoft.com/office/drawing/2014/main" id="{AC177006-2AD7-42B9-8DB0-B0A1610BFD93}"/>
+              </a:ext>
+            </a:extLst>
+          </p:cNvPr>
+          <p:cNvSpPr/>
+          <p:nvPr/>
+        </p:nvSpPr>
+        <p:spPr>
+          <a:xfrm>
+            <a:off x="809187" y="4806022"/>
+            <a:ext cx="197924" cy="108243"/>
+          </a:xfrm>
+          <a:prstGeom prst="leftArrow">
+            <a:avLst/>
+          </a:prstGeom>
+          <a:solidFill>
+            <a:schemeClr val="tx1"/>
+          </a:solidFill>
+        </p:spPr>
+        <p:style>
+          <a:lnRef idx="2">
+            <a:schemeClr val="accent1">
+              <a:shade val="50000"/>
+            </a:schemeClr>
+          </a:lnRef>
+          <a:fillRef idx="1">
+            <a:schemeClr val="accent1"/>
+          </a:fillRef>
+          <a:effectRef idx="0">
+            <a:schemeClr val="accent1"/>
+          </a:effectRef>
+          <a:fontRef idx="minor">
+            <a:schemeClr val="lt1"/>
+          </a:fontRef>
+        </p:style>
+        <p:txBody>
+          <a:bodyPr rtlCol="0" anchor="ctr"/>
+          <a:lstStyle/>
+          <a:p>
+            <a:pPr algn="ctr"/>
+            <a:endParaRPr lang="pt-BR">
+              <a:solidFill>
+                <a:schemeClr val="tx2">
+                  <a:lumMod val="75000"/>
+                </a:schemeClr>
+              </a:solidFill>
+            </a:endParaRPr>
           </a:p>
         </p:txBody>
       </p:sp>
@@ -4103,7 +4571,7 @@
             </a:pPr>
             <a:r>
               <a:rPr lang="pt-BR" dirty="0"/>
-              <a:t>       Num &lt;- 0</a:t>
+              <a:t>       Num     0</a:t>
             </a:r>
           </a:p>
           <a:p>
@@ -4147,7 +4615,7 @@
             </a:r>
             <a:r>
               <a:rPr lang="pt-BR" dirty="0"/>
-              <a:t> &lt;- cont+1</a:t>
+              <a:t>     cont+1</a:t>
             </a:r>
           </a:p>
           <a:p>
@@ -4182,16 +4650,16 @@
             </a:pPr>
             <a:r>
               <a:rPr lang="pt-BR" dirty="0"/>
-              <a:t>                            Maior &lt;- num</a:t>
-            </a:r>
-          </a:p>
-          <a:p>
-            <a:pPr marL="0" indent="0">
-              <a:buNone/>
-            </a:pPr>
-            <a:r>
-              <a:rPr lang="pt-BR" dirty="0"/>
-              <a:t>                            Menor &lt;- num</a:t>
+              <a:t>                            Maior      num</a:t>
+            </a:r>
+          </a:p>
+          <a:p>
+            <a:pPr marL="0" indent="0">
+              <a:buNone/>
+            </a:pPr>
+            <a:r>
+              <a:rPr lang="pt-BR" dirty="0"/>
+              <a:t>                            Menor     num</a:t>
             </a:r>
           </a:p>
           <a:p>
@@ -4218,7 +4686,7 @@
             </a:pPr>
             <a:r>
               <a:rPr lang="pt-BR" dirty="0"/>
-              <a:t>                                   Maior &lt;- num</a:t>
+              <a:t>                                   Maior     num</a:t>
             </a:r>
           </a:p>
           <a:p>
@@ -4250,7 +4718,7 @@
             </a:pPr>
             <a:r>
               <a:rPr lang="pt-BR" dirty="0"/>
-              <a:t>                                   Menor &lt;- num</a:t>
+              <a:t>                                   Menor     num</a:t>
             </a:r>
           </a:p>
           <a:p>
@@ -4313,6 +4781,336 @@
               <a:buNone/>
             </a:pPr>
             <a:endParaRPr lang="pt-BR" dirty="0"/>
+          </a:p>
+        </p:txBody>
+      </p:sp>
+      <p:sp>
+        <p:nvSpPr>
+          <p:cNvPr id="4" name="Seta: para a Esquerda 3">
+            <a:extLst>
+              <a:ext uri="{FF2B5EF4-FFF2-40B4-BE49-F238E27FC236}">
+                <a16:creationId xmlns:a16="http://schemas.microsoft.com/office/drawing/2014/main" id="{10509E76-F8CF-4201-BC3A-1A8C43DF644F}"/>
+              </a:ext>
+            </a:extLst>
+          </p:cNvPr>
+          <p:cNvSpPr/>
+          <p:nvPr/>
+        </p:nvSpPr>
+        <p:spPr>
+          <a:xfrm>
+            <a:off x="2272227" y="3053422"/>
+            <a:ext cx="197924" cy="108243"/>
+          </a:xfrm>
+          <a:prstGeom prst="leftArrow">
+            <a:avLst/>
+          </a:prstGeom>
+          <a:solidFill>
+            <a:schemeClr val="tx1"/>
+          </a:solidFill>
+        </p:spPr>
+        <p:style>
+          <a:lnRef idx="2">
+            <a:schemeClr val="accent1">
+              <a:shade val="50000"/>
+            </a:schemeClr>
+          </a:lnRef>
+          <a:fillRef idx="1">
+            <a:schemeClr val="accent1"/>
+          </a:fillRef>
+          <a:effectRef idx="0">
+            <a:schemeClr val="accent1"/>
+          </a:effectRef>
+          <a:fontRef idx="minor">
+            <a:schemeClr val="lt1"/>
+          </a:fontRef>
+        </p:style>
+        <p:txBody>
+          <a:bodyPr rtlCol="0" anchor="ctr"/>
+          <a:lstStyle/>
+          <a:p>
+            <a:pPr algn="ctr"/>
+            <a:endParaRPr lang="pt-BR">
+              <a:solidFill>
+                <a:schemeClr val="tx2">
+                  <a:lumMod val="75000"/>
+                </a:schemeClr>
+              </a:solidFill>
+            </a:endParaRPr>
+          </a:p>
+        </p:txBody>
+      </p:sp>
+      <p:sp>
+        <p:nvSpPr>
+          <p:cNvPr id="5" name="Seta: para a Esquerda 4">
+            <a:extLst>
+              <a:ext uri="{FF2B5EF4-FFF2-40B4-BE49-F238E27FC236}">
+                <a16:creationId xmlns:a16="http://schemas.microsoft.com/office/drawing/2014/main" id="{5A85E0CD-6AB4-4BE7-8180-ABA389A41BB9}"/>
+              </a:ext>
+            </a:extLst>
+          </p:cNvPr>
+          <p:cNvSpPr/>
+          <p:nvPr/>
+        </p:nvSpPr>
+        <p:spPr>
+          <a:xfrm>
+            <a:off x="2287467" y="3349039"/>
+            <a:ext cx="197924" cy="108243"/>
+          </a:xfrm>
+          <a:prstGeom prst="leftArrow">
+            <a:avLst/>
+          </a:prstGeom>
+          <a:solidFill>
+            <a:schemeClr val="tx1"/>
+          </a:solidFill>
+        </p:spPr>
+        <p:style>
+          <a:lnRef idx="2">
+            <a:schemeClr val="accent1">
+              <a:shade val="50000"/>
+            </a:schemeClr>
+          </a:lnRef>
+          <a:fillRef idx="1">
+            <a:schemeClr val="accent1"/>
+          </a:fillRef>
+          <a:effectRef idx="0">
+            <a:schemeClr val="accent1"/>
+          </a:effectRef>
+          <a:fontRef idx="minor">
+            <a:schemeClr val="lt1"/>
+          </a:fontRef>
+        </p:style>
+        <p:txBody>
+          <a:bodyPr rtlCol="0" anchor="ctr"/>
+          <a:lstStyle/>
+          <a:p>
+            <a:pPr algn="ctr"/>
+            <a:endParaRPr lang="pt-BR">
+              <a:solidFill>
+                <a:schemeClr val="tx2">
+                  <a:lumMod val="75000"/>
+                </a:schemeClr>
+              </a:solidFill>
+            </a:endParaRPr>
+          </a:p>
+        </p:txBody>
+      </p:sp>
+      <p:sp>
+        <p:nvSpPr>
+          <p:cNvPr id="6" name="Seta: para a Esquerda 5">
+            <a:extLst>
+              <a:ext uri="{FF2B5EF4-FFF2-40B4-BE49-F238E27FC236}">
+                <a16:creationId xmlns:a16="http://schemas.microsoft.com/office/drawing/2014/main" id="{7420B353-FD8E-42E4-B079-2337801D3028}"/>
+              </a:ext>
+            </a:extLst>
+          </p:cNvPr>
+          <p:cNvSpPr/>
+          <p:nvPr/>
+        </p:nvSpPr>
+        <p:spPr>
+          <a:xfrm>
+            <a:off x="2630367" y="4196422"/>
+            <a:ext cx="197924" cy="108243"/>
+          </a:xfrm>
+          <a:prstGeom prst="leftArrow">
+            <a:avLst/>
+          </a:prstGeom>
+          <a:solidFill>
+            <a:schemeClr val="tx1"/>
+          </a:solidFill>
+        </p:spPr>
+        <p:style>
+          <a:lnRef idx="2">
+            <a:schemeClr val="accent1">
+              <a:shade val="50000"/>
+            </a:schemeClr>
+          </a:lnRef>
+          <a:fillRef idx="1">
+            <a:schemeClr val="accent1"/>
+          </a:fillRef>
+          <a:effectRef idx="0">
+            <a:schemeClr val="accent1"/>
+          </a:effectRef>
+          <a:fontRef idx="minor">
+            <a:schemeClr val="lt1"/>
+          </a:fontRef>
+        </p:style>
+        <p:txBody>
+          <a:bodyPr rtlCol="0" anchor="ctr"/>
+          <a:lstStyle/>
+          <a:p>
+            <a:pPr algn="ctr"/>
+            <a:endParaRPr lang="pt-BR">
+              <a:solidFill>
+                <a:schemeClr val="tx2">
+                  <a:lumMod val="75000"/>
+                </a:schemeClr>
+              </a:solidFill>
+            </a:endParaRPr>
+          </a:p>
+        </p:txBody>
+      </p:sp>
+      <p:sp>
+        <p:nvSpPr>
+          <p:cNvPr id="7" name="Seta: para a Esquerda 6">
+            <a:extLst>
+              <a:ext uri="{FF2B5EF4-FFF2-40B4-BE49-F238E27FC236}">
+                <a16:creationId xmlns:a16="http://schemas.microsoft.com/office/drawing/2014/main" id="{3075614D-82BA-4600-8C69-70DCAB6B2974}"/>
+              </a:ext>
+            </a:extLst>
+          </p:cNvPr>
+          <p:cNvSpPr/>
+          <p:nvPr/>
+        </p:nvSpPr>
+        <p:spPr>
+          <a:xfrm>
+            <a:off x="2660847" y="5072722"/>
+            <a:ext cx="197924" cy="108243"/>
+          </a:xfrm>
+          <a:prstGeom prst="leftArrow">
+            <a:avLst/>
+          </a:prstGeom>
+          <a:solidFill>
+            <a:schemeClr val="tx1"/>
+          </a:solidFill>
+        </p:spPr>
+        <p:style>
+          <a:lnRef idx="2">
+            <a:schemeClr val="accent1">
+              <a:shade val="50000"/>
+            </a:schemeClr>
+          </a:lnRef>
+          <a:fillRef idx="1">
+            <a:schemeClr val="accent1"/>
+          </a:fillRef>
+          <a:effectRef idx="0">
+            <a:schemeClr val="accent1"/>
+          </a:effectRef>
+          <a:fontRef idx="minor">
+            <a:schemeClr val="lt1"/>
+          </a:fontRef>
+        </p:style>
+        <p:txBody>
+          <a:bodyPr rtlCol="0" anchor="ctr"/>
+          <a:lstStyle/>
+          <a:p>
+            <a:pPr algn="ctr"/>
+            <a:endParaRPr lang="pt-BR">
+              <a:solidFill>
+                <a:schemeClr val="tx2">
+                  <a:lumMod val="75000"/>
+                </a:schemeClr>
+              </a:solidFill>
+            </a:endParaRPr>
+          </a:p>
+        </p:txBody>
+      </p:sp>
+      <p:sp>
+        <p:nvSpPr>
+          <p:cNvPr id="8" name="Seta: para a Esquerda 7">
+            <a:extLst>
+              <a:ext uri="{FF2B5EF4-FFF2-40B4-BE49-F238E27FC236}">
+                <a16:creationId xmlns:a16="http://schemas.microsoft.com/office/drawing/2014/main" id="{5086A797-03A4-4511-93B3-202155C9054B}"/>
+              </a:ext>
+            </a:extLst>
+          </p:cNvPr>
+          <p:cNvSpPr/>
+          <p:nvPr/>
+        </p:nvSpPr>
+        <p:spPr>
+          <a:xfrm>
+            <a:off x="1411167" y="2184742"/>
+            <a:ext cx="197924" cy="108243"/>
+          </a:xfrm>
+          <a:prstGeom prst="leftArrow">
+            <a:avLst/>
+          </a:prstGeom>
+          <a:solidFill>
+            <a:schemeClr val="tx1"/>
+          </a:solidFill>
+        </p:spPr>
+        <p:style>
+          <a:lnRef idx="2">
+            <a:schemeClr val="accent1">
+              <a:shade val="50000"/>
+            </a:schemeClr>
+          </a:lnRef>
+          <a:fillRef idx="1">
+            <a:schemeClr val="accent1"/>
+          </a:fillRef>
+          <a:effectRef idx="0">
+            <a:schemeClr val="accent1"/>
+          </a:effectRef>
+          <a:fontRef idx="minor">
+            <a:schemeClr val="lt1"/>
+          </a:fontRef>
+        </p:style>
+        <p:txBody>
+          <a:bodyPr rtlCol="0" anchor="ctr"/>
+          <a:lstStyle/>
+          <a:p>
+            <a:pPr algn="ctr"/>
+            <a:endParaRPr lang="pt-BR">
+              <a:solidFill>
+                <a:schemeClr val="tx2">
+                  <a:lumMod val="75000"/>
+                </a:schemeClr>
+              </a:solidFill>
+            </a:endParaRPr>
+          </a:p>
+        </p:txBody>
+      </p:sp>
+      <p:sp>
+        <p:nvSpPr>
+          <p:cNvPr id="9" name="Seta: para a Esquerda 8">
+            <a:extLst>
+              <a:ext uri="{FF2B5EF4-FFF2-40B4-BE49-F238E27FC236}">
+                <a16:creationId xmlns:a16="http://schemas.microsoft.com/office/drawing/2014/main" id="{F9C2B46E-E9BB-4805-A29C-7F1F0315861C}"/>
+              </a:ext>
+            </a:extLst>
+          </p:cNvPr>
+          <p:cNvSpPr/>
+          <p:nvPr/>
+        </p:nvSpPr>
+        <p:spPr>
+          <a:xfrm>
+            <a:off x="1068267" y="1056982"/>
+            <a:ext cx="197924" cy="108243"/>
+          </a:xfrm>
+          <a:prstGeom prst="leftArrow">
+            <a:avLst/>
+          </a:prstGeom>
+          <a:solidFill>
+            <a:schemeClr val="tx1"/>
+          </a:solidFill>
+        </p:spPr>
+        <p:style>
+          <a:lnRef idx="2">
+            <a:schemeClr val="accent1">
+              <a:shade val="50000"/>
+            </a:schemeClr>
+          </a:lnRef>
+          <a:fillRef idx="1">
+            <a:schemeClr val="accent1"/>
+          </a:fillRef>
+          <a:effectRef idx="0">
+            <a:schemeClr val="accent1"/>
+          </a:effectRef>
+          <a:fontRef idx="minor">
+            <a:schemeClr val="lt1"/>
+          </a:fontRef>
+        </p:style>
+        <p:txBody>
+          <a:bodyPr rtlCol="0" anchor="ctr"/>
+          <a:lstStyle/>
+          <a:p>
+            <a:pPr algn="ctr"/>
+            <a:endParaRPr lang="pt-BR">
+              <a:solidFill>
+                <a:schemeClr val="tx2">
+                  <a:lumMod val="75000"/>
+                </a:schemeClr>
+              </a:solidFill>
+            </a:endParaRPr>
           </a:p>
         </p:txBody>
       </p:sp>
@@ -4407,13 +5205,13 @@
           <a:p>
             <a:r>
               <a:rPr lang="pt-BR" dirty="0"/>
-              <a:t>conjuntos de regras utilizadas para criar um programa</a:t>
-            </a:r>
-          </a:p>
-          <a:p>
-            <a:r>
-              <a:rPr lang="pt-BR" dirty="0"/>
-              <a:t>os algoritmos são escritos em uma linguagem de programação, gerando o código fonte</a:t>
+              <a:t>Conjuntos de regras utilizadas para criar um programa</a:t>
+            </a:r>
+          </a:p>
+          <a:p>
+            <a:r>
+              <a:rPr lang="pt-BR" dirty="0"/>
+              <a:t>Os algoritmos são escritos em uma linguagem de programação, gerando o código fonte</a:t>
             </a:r>
           </a:p>
         </p:txBody>
@@ -4499,34 +5297,34 @@
           <a:p>
             <a:r>
               <a:rPr lang="pt-BR" dirty="0"/>
-              <a:t>há três níveis principais de linguagens de programação:</a:t>
-            </a:r>
-          </a:p>
-          <a:p>
-            <a:pPr marL="0" indent="0">
-              <a:buNone/>
-            </a:pPr>
-            <a:r>
-              <a:rPr lang="pt-BR" dirty="0"/>
-              <a:t>	-linguagem de maquina</a:t>
-            </a:r>
-          </a:p>
-          <a:p>
-            <a:pPr marL="0" indent="0">
-              <a:buNone/>
-            </a:pPr>
-            <a:r>
-              <a:rPr lang="pt-BR" dirty="0"/>
-              <a:t>	-linguagem de baixo nível</a:t>
-            </a:r>
-          </a:p>
-          <a:p>
-            <a:pPr marL="0" indent="0">
-              <a:buNone/>
-            </a:pPr>
-            <a:r>
-              <a:rPr lang="pt-BR" dirty="0"/>
-              <a:t>	-linguagem de alto nível</a:t>
+              <a:t>Há três níveis principais de linguagens de programação:</a:t>
+            </a:r>
+          </a:p>
+          <a:p>
+            <a:pPr marL="0" indent="0">
+              <a:buNone/>
+            </a:pPr>
+            <a:r>
+              <a:rPr lang="pt-BR" dirty="0"/>
+              <a:t>	-Linguagem de maquina</a:t>
+            </a:r>
+          </a:p>
+          <a:p>
+            <a:pPr marL="0" indent="0">
+              <a:buNone/>
+            </a:pPr>
+            <a:r>
+              <a:rPr lang="pt-BR" dirty="0"/>
+              <a:t>	-Linguagem de baixo nível</a:t>
+            </a:r>
+          </a:p>
+          <a:p>
+            <a:pPr marL="0" indent="0">
+              <a:buNone/>
+            </a:pPr>
+            <a:r>
+              <a:rPr lang="pt-BR" dirty="0"/>
+              <a:t>	-Linguagem de alto nível</a:t>
             </a:r>
           </a:p>
           <a:p>
@@ -4615,51 +5413,22 @@
           <a:p>
             <a:r>
               <a:rPr lang="pt-BR" dirty="0"/>
-              <a:t>interpretador - o código é executado assim que é traduzido, é </a:t>
-            </a:r>
-            <a:r>
-              <a:rPr lang="pt-BR" dirty="0" err="1"/>
-              <a:t>necessaria</a:t>
-            </a:r>
-            <a:r>
-              <a:rPr lang="pt-BR" dirty="0"/>
-              <a:t> a interpretação toda vez que for rodar o programa</a:t>
-            </a:r>
-          </a:p>
-          <a:p>
-            <a:r>
-              <a:rPr lang="pt-BR" dirty="0"/>
-              <a:t>compilador - traduz todo o código para um ou mais arquivos que podem ser executado quantas vezes forem </a:t>
-            </a:r>
-            <a:r>
-              <a:rPr lang="pt-BR" dirty="0" err="1"/>
-              <a:t>necessarias</a:t>
-            </a:r>
-            <a:r>
-              <a:rPr lang="pt-BR" dirty="0"/>
-              <a:t> sem necessidade de uma nova compilação</a:t>
-            </a:r>
-          </a:p>
-          <a:p>
-            <a:r>
-              <a:rPr lang="pt-BR" dirty="0"/>
-              <a:t>hibrido - traduz o </a:t>
-            </a:r>
-            <a:r>
-              <a:rPr lang="pt-BR" dirty="0" err="1"/>
-              <a:t>codigo</a:t>
-            </a:r>
-            <a:r>
-              <a:rPr lang="pt-BR" dirty="0"/>
-              <a:t> fonte para </a:t>
-            </a:r>
-            <a:r>
-              <a:rPr lang="pt-BR" dirty="0" err="1"/>
-              <a:t>pseudocodigo</a:t>
-            </a:r>
-            <a:r>
-              <a:rPr lang="pt-BR" dirty="0"/>
-              <a:t>, que é executado por um interpretador</a:t>
+              <a:t>Interpretador - o código é executado assim que é traduzido, é necessária a interpretação toda vez que for rodar o programa</a:t>
+            </a:r>
+          </a:p>
+          <a:p>
+            <a:endParaRPr lang="pt-BR" dirty="0"/>
+          </a:p>
+          <a:p>
+            <a:r>
+              <a:rPr lang="pt-BR" dirty="0"/>
+              <a:t>Compilador - traduz todo o código para um ou mais arquivos que podem ser executado quantas vezes forem necessárias sem necessidade de uma nova compilação</a:t>
+            </a:r>
+          </a:p>
+          <a:p>
+            <a:r>
+              <a:rPr lang="pt-BR" dirty="0"/>
+              <a:t>Hibrido - traduz o codigo fonte para pseudocodigo, que é executado por um interpretador</a:t>
             </a:r>
           </a:p>
           <a:p>
@@ -4725,108 +5494,170 @@
           </a:p>
         </p:txBody>
       </p:sp>
-      <p:sp>
-        <p:nvSpPr>
-          <p:cNvPr id="3" name="Espaço Reservado para Conteúdo 2">
+      <p:graphicFrame>
+        <p:nvGraphicFramePr>
+          <p:cNvPr id="13" name="Tabela 12">
             <a:extLst>
               <a:ext uri="{FF2B5EF4-FFF2-40B4-BE49-F238E27FC236}">
-                <a16:creationId xmlns:a16="http://schemas.microsoft.com/office/drawing/2014/main" id="{196F6EF1-33B9-4671-874C-EA4A8111228C}"/>
+                <a16:creationId xmlns:a16="http://schemas.microsoft.com/office/drawing/2014/main" id="{182103FD-7473-48C7-9212-6B71CCFCB1B8}"/>
               </a:ext>
             </a:extLst>
           </p:cNvPr>
-          <p:cNvSpPr>
-            <a:spLocks noGrp="1"/>
-          </p:cNvSpPr>
-          <p:nvPr>
-            <p:ph idx="1"/>
-          </p:nvPr>
-        </p:nvSpPr>
-        <p:spPr>
-          <a:xfrm>
-            <a:off x="838200" y="1825625"/>
-            <a:ext cx="10515600" cy="4518904"/>
-          </a:xfrm>
-        </p:spPr>
-        <p:txBody>
-          <a:bodyPr numCol="2" anchor="ctr"/>
-          <a:lstStyle/>
-          <a:p>
-            <a:r>
-              <a:rPr lang="pt-BR" dirty="0"/>
-              <a:t>para contador de x até x faça:</a:t>
-            </a:r>
-          </a:p>
-          <a:p>
-            <a:r>
-              <a:rPr lang="pt-BR" dirty="0"/>
-              <a:t>	&lt;código&gt;</a:t>
-            </a:r>
-          </a:p>
-          <a:p>
-            <a:r>
-              <a:rPr lang="pt-BR" dirty="0"/>
-              <a:t>fim-para </a:t>
-            </a:r>
-          </a:p>
-          <a:p>
-            <a:endParaRPr lang="pt-BR" dirty="0"/>
-          </a:p>
-          <a:p>
-            <a:endParaRPr lang="pt-BR" dirty="0"/>
-          </a:p>
-          <a:p>
-            <a:r>
-              <a:rPr lang="pt-BR" dirty="0"/>
-              <a:t>enquanto x &lt; y faça</a:t>
-            </a:r>
-          </a:p>
-          <a:p>
-            <a:r>
-              <a:rPr lang="pt-BR" dirty="0"/>
-              <a:t>	&lt;código&gt;</a:t>
-            </a:r>
-          </a:p>
-          <a:p>
-            <a:r>
-              <a:rPr lang="pt-BR" dirty="0"/>
-              <a:t>fim-enquanto</a:t>
-            </a:r>
-          </a:p>
-          <a:p>
-            <a:pPr marL="0" indent="0">
-              <a:buNone/>
-            </a:pPr>
-            <a:r>
-              <a:rPr lang="pt-BR" dirty="0"/>
-              <a:t>      repita</a:t>
-            </a:r>
-          </a:p>
-          <a:p>
-            <a:pPr marL="0" indent="0">
-              <a:buNone/>
-            </a:pPr>
-            <a:r>
-              <a:rPr lang="pt-BR" dirty="0"/>
-              <a:t>	   &lt;comandos&gt;</a:t>
-            </a:r>
-          </a:p>
-          <a:p>
-            <a:pPr marL="0" indent="0">
-              <a:buNone/>
-            </a:pPr>
-            <a:r>
-              <a:rPr lang="pt-BR" dirty="0"/>
-              <a:t>       até que &lt;condição)</a:t>
-            </a:r>
-          </a:p>
-          <a:p>
-            <a:pPr marL="0" indent="0">
-              <a:buNone/>
-            </a:pPr>
-            <a:endParaRPr lang="pt-BR" dirty="0"/>
-          </a:p>
-        </p:txBody>
-      </p:sp>
+          <p:cNvGraphicFramePr>
+            <a:graphicFrameLocks noGrp="1"/>
+          </p:cNvGraphicFramePr>
+          <p:nvPr>
+            <p:extLst>
+              <p:ext uri="{D42A27DB-BD31-4B8C-83A1-F6EECF244321}">
+                <p14:modId xmlns:p14="http://schemas.microsoft.com/office/powerpoint/2010/main" val="399175909"/>
+              </p:ext>
+            </p:extLst>
+          </p:nvPr>
+        </p:nvGraphicFramePr>
+        <p:xfrm>
+          <a:off x="584200" y="1690688"/>
+          <a:ext cx="8921750" cy="4732232"/>
+        </p:xfrm>
+        <a:graphic>
+          <a:graphicData uri="http://schemas.openxmlformats.org/drawingml/2006/table">
+            <a:tbl>
+              <a:tblPr firstRow="1" bandRow="1">
+                <a:tableStyleId>{22838BEF-8BB2-4498-84A7-C5851F593DF1}</a:tableStyleId>
+              </a:tblPr>
+              <a:tblGrid>
+                <a:gridCol w="4460875">
+                  <a:extLst>
+                    <a:ext uri="{9D8B030D-6E8A-4147-A177-3AD203B41FA5}">
+                      <a16:colId xmlns:a16="http://schemas.microsoft.com/office/drawing/2014/main" val="2526968436"/>
+                    </a:ext>
+                  </a:extLst>
+                </a:gridCol>
+                <a:gridCol w="4460875">
+                  <a:extLst>
+                    <a:ext uri="{9D8B030D-6E8A-4147-A177-3AD203B41FA5}">
+                      <a16:colId xmlns:a16="http://schemas.microsoft.com/office/drawing/2014/main" val="2262074750"/>
+                    </a:ext>
+                  </a:extLst>
+                </a:gridCol>
+              </a:tblGrid>
+              <a:tr h="1897592">
+                <a:tc>
+                  <a:txBody>
+                    <a:bodyPr/>
+                    <a:lstStyle/>
+                    <a:p>
+                      <a:r>
+                        <a:rPr lang="pt-BR" sz="3600" b="0" dirty="0"/>
+                        <a:t>para </a:t>
+                      </a:r>
+                      <a:r>
+                        <a:rPr lang="pt-BR" sz="3600" b="0" dirty="0" err="1"/>
+                        <a:t>cont</a:t>
+                      </a:r>
+                      <a:r>
+                        <a:rPr lang="pt-BR" sz="3600" b="0" dirty="0"/>
+                        <a:t> de x até x faça:</a:t>
+                      </a:r>
+                    </a:p>
+                    <a:p>
+                      <a:r>
+                        <a:rPr lang="pt-BR" sz="3600" b="0" dirty="0"/>
+                        <a:t>	&lt;código&gt;</a:t>
+                      </a:r>
+                    </a:p>
+                    <a:p>
+                      <a:r>
+                        <a:rPr lang="pt-BR" sz="3600" b="0" dirty="0"/>
+                        <a:t>fim-para</a:t>
+                      </a:r>
+                    </a:p>
+                    <a:p>
+                      <a:endParaRPr lang="pt-BR" sz="3600" b="0" dirty="0"/>
+                    </a:p>
+                  </a:txBody>
+                  <a:tcPr/>
+                </a:tc>
+                <a:tc>
+                  <a:txBody>
+                    <a:bodyPr/>
+                    <a:lstStyle/>
+                    <a:p>
+                      <a:r>
+                        <a:rPr lang="pt-BR" sz="3600" b="0" dirty="0"/>
+                        <a:t>repita</a:t>
+                      </a:r>
+                    </a:p>
+                    <a:p>
+                      <a:r>
+                        <a:rPr lang="pt-BR" sz="3600" b="0" dirty="0"/>
+                        <a:t>	&lt;comandos&gt;</a:t>
+                      </a:r>
+                    </a:p>
+                    <a:p>
+                      <a:r>
+                        <a:rPr lang="pt-BR" sz="3600" b="0" dirty="0"/>
+                        <a:t>até que &lt;condição)</a:t>
+                      </a:r>
+                    </a:p>
+                  </a:txBody>
+                  <a:tcPr/>
+                </a:tc>
+                <a:extLst>
+                  <a:ext uri="{0D108BD9-81ED-4DB2-BD59-A6C34878D82A}">
+                    <a16:rowId xmlns:a16="http://schemas.microsoft.com/office/drawing/2014/main" val="585747974"/>
+                  </a:ext>
+                </a:extLst>
+              </a:tr>
+              <a:tr h="1897592">
+                <a:tc gridSpan="2">
+                  <a:txBody>
+                    <a:bodyPr/>
+                    <a:lstStyle/>
+                    <a:p>
+                      <a:r>
+                        <a:rPr lang="pt-BR" sz="3600" b="0" dirty="0"/>
+                        <a:t>enquanto x &lt; y faça</a:t>
+                      </a:r>
+                    </a:p>
+                    <a:p>
+                      <a:r>
+                        <a:rPr lang="pt-BR" sz="3600" b="0" dirty="0"/>
+                        <a:t>	&lt;código&gt;</a:t>
+                      </a:r>
+                    </a:p>
+                    <a:p>
+                      <a:r>
+                        <a:rPr lang="pt-BR" sz="3600" b="0" dirty="0"/>
+                        <a:t>fim-enquanto</a:t>
+                      </a:r>
+                    </a:p>
+                  </a:txBody>
+                  <a:tcPr>
+                    <a:noFill/>
+                  </a:tcPr>
+                </a:tc>
+                <a:tc hMerge="1">
+                  <a:txBody>
+                    <a:bodyPr/>
+                    <a:lstStyle/>
+                    <a:p>
+                      <a:endParaRPr lang="pt-BR" dirty="0"/>
+                    </a:p>
+                  </a:txBody>
+                  <a:tcPr>
+                    <a:noFill/>
+                  </a:tcPr>
+                </a:tc>
+                <a:extLst>
+                  <a:ext uri="{0D108BD9-81ED-4DB2-BD59-A6C34878D82A}">
+                    <a16:rowId xmlns:a16="http://schemas.microsoft.com/office/drawing/2014/main" val="3431047295"/>
+                  </a:ext>
+                </a:extLst>
+              </a:tr>
+            </a:tbl>
+          </a:graphicData>
+        </a:graphic>
+      </p:graphicFrame>
     </p:spTree>
     <p:extLst>
       <p:ext uri="{BB962C8B-B14F-4D97-AF65-F5344CB8AC3E}">
@@ -5365,7 +6196,7 @@
                   <a:schemeClr val="tx1"/>
                 </a:solidFill>
               </a:rPr>
-              <a:t>algoritmo 'nome'</a:t>
+              <a:t>Algoritmo 'nome'</a:t>
             </a:r>
           </a:p>
           <a:p>
@@ -5508,156 +6339,267 @@
           </a:p>
         </p:txBody>
       </p:sp>
-      <p:sp>
-        <p:nvSpPr>
-          <p:cNvPr id="3" name="Espaço Reservado para Conteúdo 2">
+      <p:graphicFrame>
+        <p:nvGraphicFramePr>
+          <p:cNvPr id="8" name="Tabela 7">
             <a:extLst>
               <a:ext uri="{FF2B5EF4-FFF2-40B4-BE49-F238E27FC236}">
-                <a16:creationId xmlns:a16="http://schemas.microsoft.com/office/drawing/2014/main" id="{3125B44C-8DCF-4310-9863-AF08214CA916}"/>
+                <a16:creationId xmlns:a16="http://schemas.microsoft.com/office/drawing/2014/main" id="{802BF8E1-D6D7-4D05-8F3C-B72D4143A14C}"/>
               </a:ext>
             </a:extLst>
           </p:cNvPr>
-          <p:cNvSpPr>
-            <a:spLocks noGrp="1"/>
-          </p:cNvSpPr>
-          <p:nvPr>
-            <p:ph idx="1"/>
-          </p:nvPr>
-        </p:nvSpPr>
-        <p:spPr/>
-        <p:txBody>
-          <a:bodyPr numCol="2"/>
-          <a:lstStyle/>
-          <a:p>
-            <a:pPr marL="0" indent="0">
-              <a:buNone/>
-            </a:pPr>
-            <a:r>
-              <a:rPr lang="pt-BR" dirty="0"/>
-              <a:t>se &lt;condição&gt; faça</a:t>
-            </a:r>
-          </a:p>
-          <a:p>
-            <a:pPr marL="0" indent="0">
-              <a:buNone/>
-            </a:pPr>
-            <a:r>
-              <a:rPr lang="pt-BR" dirty="0"/>
-              <a:t>	&lt;código&gt;</a:t>
-            </a:r>
-          </a:p>
-          <a:p>
-            <a:pPr marL="0" indent="0">
-              <a:buNone/>
-            </a:pPr>
-            <a:r>
-              <a:rPr lang="pt-BR" dirty="0"/>
-              <a:t>senão</a:t>
-            </a:r>
-          </a:p>
-          <a:p>
-            <a:pPr marL="0" indent="0">
-              <a:buNone/>
-            </a:pPr>
-            <a:r>
-              <a:rPr lang="pt-BR" dirty="0"/>
-              <a:t>	&lt;código&gt;</a:t>
-            </a:r>
-          </a:p>
-          <a:p>
-            <a:pPr marL="0" indent="0">
-              <a:buNone/>
-            </a:pPr>
-            <a:r>
-              <a:rPr lang="pt-BR" dirty="0" err="1"/>
-              <a:t>fim-se</a:t>
-            </a:r>
-            <a:endParaRPr lang="pt-BR" dirty="0"/>
-          </a:p>
-          <a:p>
-            <a:pPr marL="0" indent="0">
-              <a:buNone/>
-            </a:pPr>
-            <a:endParaRPr lang="pt-BR" dirty="0"/>
-          </a:p>
-          <a:p>
-            <a:pPr marL="0" indent="0">
-              <a:buNone/>
-            </a:pPr>
-            <a:endParaRPr lang="pt-BR" dirty="0"/>
-          </a:p>
-          <a:p>
-            <a:pPr marL="0" indent="0">
-              <a:buNone/>
-            </a:pPr>
-            <a:endParaRPr lang="pt-BR" dirty="0"/>
-          </a:p>
-          <a:p>
-            <a:pPr marL="0" indent="0">
-              <a:buNone/>
-            </a:pPr>
-            <a:r>
-              <a:rPr lang="pt-BR" dirty="0"/>
-              <a:t>se &lt;condição&gt; faça</a:t>
-            </a:r>
-          </a:p>
-          <a:p>
-            <a:pPr marL="0" indent="0">
-              <a:buNone/>
-            </a:pPr>
-            <a:r>
-              <a:rPr lang="pt-BR" dirty="0"/>
-              <a:t>	&lt;código&gt;</a:t>
-            </a:r>
-          </a:p>
-          <a:p>
-            <a:pPr marL="0" indent="0">
-              <a:buNone/>
-            </a:pPr>
-            <a:r>
-              <a:rPr lang="pt-BR" dirty="0"/>
-              <a:t>senão se &lt;&gt;condição&gt; faça</a:t>
-            </a:r>
-          </a:p>
-          <a:p>
-            <a:pPr marL="0" indent="0">
-              <a:buNone/>
-            </a:pPr>
-            <a:r>
-              <a:rPr lang="pt-BR" dirty="0"/>
-              <a:t>	&lt;código&gt;</a:t>
-            </a:r>
-          </a:p>
-          <a:p>
-            <a:pPr marL="0" indent="0">
-              <a:buNone/>
-            </a:pPr>
-            <a:r>
-              <a:rPr lang="pt-BR" dirty="0"/>
-              <a:t>senão</a:t>
-            </a:r>
-          </a:p>
-          <a:p>
-            <a:pPr marL="0" indent="0">
-              <a:buNone/>
-            </a:pPr>
-            <a:r>
-              <a:rPr lang="pt-BR" dirty="0"/>
-              <a:t>	&lt;código&gt;</a:t>
-            </a:r>
-          </a:p>
-          <a:p>
-            <a:pPr marL="0" indent="0">
-              <a:buNone/>
-            </a:pPr>
-            <a:r>
-              <a:rPr lang="pt-BR" dirty="0" err="1"/>
-              <a:t>fim-se</a:t>
-            </a:r>
-            <a:endParaRPr lang="pt-BR" dirty="0"/>
-          </a:p>
-        </p:txBody>
-      </p:sp>
+          <p:cNvGraphicFramePr>
+            <a:graphicFrameLocks noGrp="1"/>
+          </p:cNvGraphicFramePr>
+          <p:nvPr>
+            <p:extLst>
+              <p:ext uri="{D42A27DB-BD31-4B8C-83A1-F6EECF244321}">
+                <p14:modId xmlns:p14="http://schemas.microsoft.com/office/powerpoint/2010/main" val="1282002282"/>
+              </p:ext>
+            </p:extLst>
+          </p:nvPr>
+        </p:nvGraphicFramePr>
+        <p:xfrm>
+          <a:off x="838200" y="1690688"/>
+          <a:ext cx="10039350" cy="4652962"/>
+        </p:xfrm>
+        <a:graphic>
+          <a:graphicData uri="http://schemas.openxmlformats.org/drawingml/2006/table">
+            <a:tbl>
+              <a:tblPr firstRow="1" bandRow="1">
+                <a:tableStyleId>{22838BEF-8BB2-4498-84A7-C5851F593DF1}</a:tableStyleId>
+              </a:tblPr>
+              <a:tblGrid>
+                <a:gridCol w="5019675">
+                  <a:extLst>
+                    <a:ext uri="{9D8B030D-6E8A-4147-A177-3AD203B41FA5}">
+                      <a16:colId xmlns:a16="http://schemas.microsoft.com/office/drawing/2014/main" val="2464449247"/>
+                    </a:ext>
+                  </a:extLst>
+                </a:gridCol>
+                <a:gridCol w="5019675">
+                  <a:extLst>
+                    <a:ext uri="{9D8B030D-6E8A-4147-A177-3AD203B41FA5}">
+                      <a16:colId xmlns:a16="http://schemas.microsoft.com/office/drawing/2014/main" val="68401094"/>
+                    </a:ext>
+                  </a:extLst>
+                </a:gridCol>
+              </a:tblGrid>
+              <a:tr h="4652962">
+                <a:tc>
+                  <a:txBody>
+                    <a:bodyPr/>
+                    <a:lstStyle/>
+                    <a:p>
+                      <a:pPr marL="0" indent="0">
+                        <a:buNone/>
+                      </a:pPr>
+                      <a:r>
+                        <a:rPr lang="pt-BR" sz="3200" b="0" dirty="0">
+                          <a:solidFill>
+                            <a:schemeClr val="tx1"/>
+                          </a:solidFill>
+                        </a:rPr>
+                        <a:t>se &lt;condição&gt; faça</a:t>
+                      </a:r>
+                    </a:p>
+                    <a:p>
+                      <a:pPr marL="0" indent="0">
+                        <a:buNone/>
+                      </a:pPr>
+                      <a:r>
+                        <a:rPr lang="pt-BR" sz="3200" b="0" dirty="0">
+                          <a:solidFill>
+                            <a:schemeClr val="tx1"/>
+                          </a:solidFill>
+                        </a:rPr>
+                        <a:t>	&lt;código&gt;</a:t>
+                      </a:r>
+                    </a:p>
+                    <a:p>
+                      <a:pPr marL="0" indent="0">
+                        <a:buNone/>
+                      </a:pPr>
+                      <a:r>
+                        <a:rPr lang="pt-BR" sz="3200" b="0" dirty="0">
+                          <a:solidFill>
+                            <a:schemeClr val="tx1"/>
+                          </a:solidFill>
+                        </a:rPr>
+                        <a:t>senão</a:t>
+                      </a:r>
+                    </a:p>
+                    <a:p>
+                      <a:pPr marL="0" indent="0">
+                        <a:buNone/>
+                      </a:pPr>
+                      <a:r>
+                        <a:rPr lang="pt-BR" sz="3200" b="0" dirty="0">
+                          <a:solidFill>
+                            <a:schemeClr val="tx1"/>
+                          </a:solidFill>
+                        </a:rPr>
+                        <a:t>	&lt;código&gt;</a:t>
+                      </a:r>
+                    </a:p>
+                    <a:p>
+                      <a:pPr marL="0" indent="0">
+                        <a:buNone/>
+                      </a:pPr>
+                      <a:r>
+                        <a:rPr lang="pt-BR" sz="3200" b="0" dirty="0" err="1">
+                          <a:solidFill>
+                            <a:schemeClr val="tx1"/>
+                          </a:solidFill>
+                        </a:rPr>
+                        <a:t>fim-se</a:t>
+                      </a:r>
+                      <a:endParaRPr lang="pt-BR" sz="3200" b="0" dirty="0">
+                        <a:solidFill>
+                          <a:schemeClr val="tx1"/>
+                        </a:solidFill>
+                      </a:endParaRPr>
+                    </a:p>
+                    <a:p>
+                      <a:pPr marL="0" indent="0">
+                        <a:buNone/>
+                      </a:pPr>
+                      <a:endParaRPr lang="pt-BR" sz="3200" b="0" dirty="0">
+                        <a:solidFill>
+                          <a:schemeClr val="tx1"/>
+                        </a:solidFill>
+                      </a:endParaRPr>
+                    </a:p>
+                    <a:p>
+                      <a:pPr marL="0" indent="0">
+                        <a:buNone/>
+                      </a:pPr>
+                      <a:endParaRPr lang="pt-BR" sz="3200" b="0" dirty="0">
+                        <a:solidFill>
+                          <a:schemeClr val="tx1"/>
+                        </a:solidFill>
+                      </a:endParaRPr>
+                    </a:p>
+                  </a:txBody>
+                  <a:tcPr>
+                    <a:noFill/>
+                  </a:tcPr>
+                </a:tc>
+                <a:tc>
+                  <a:txBody>
+                    <a:bodyPr/>
+                    <a:lstStyle/>
+                    <a:p>
+                      <a:pPr marL="0" indent="0">
+                        <a:buNone/>
+                      </a:pPr>
+                      <a:r>
+                        <a:rPr lang="pt-BR" sz="3200" b="0" dirty="0">
+                          <a:solidFill>
+                            <a:schemeClr val="tx1"/>
+                          </a:solidFill>
+                        </a:rPr>
+                        <a:t>se &lt;condição&gt; faça</a:t>
+                      </a:r>
+                    </a:p>
+                    <a:p>
+                      <a:pPr marL="0" indent="0">
+                        <a:buNone/>
+                      </a:pPr>
+                      <a:r>
+                        <a:rPr lang="pt-BR" sz="3200" b="0" dirty="0">
+                          <a:solidFill>
+                            <a:schemeClr val="tx1"/>
+                          </a:solidFill>
+                        </a:rPr>
+                        <a:t>	&lt;código&gt;</a:t>
+                      </a:r>
+                    </a:p>
+                    <a:p>
+                      <a:pPr marL="0" indent="0">
+                        <a:buNone/>
+                      </a:pPr>
+                      <a:r>
+                        <a:rPr lang="pt-BR" sz="3200" b="0" dirty="0">
+                          <a:solidFill>
+                            <a:schemeClr val="tx1"/>
+                          </a:solidFill>
+                        </a:rPr>
+                        <a:t>senão se &lt;&gt;condição&gt; faça</a:t>
+                      </a:r>
+                    </a:p>
+                    <a:p>
+                      <a:pPr marL="0" indent="0">
+                        <a:buNone/>
+                      </a:pPr>
+                      <a:r>
+                        <a:rPr lang="pt-BR" sz="3200" b="0" dirty="0">
+                          <a:solidFill>
+                            <a:schemeClr val="tx1"/>
+                          </a:solidFill>
+                        </a:rPr>
+                        <a:t>	&lt;código&gt;</a:t>
+                      </a:r>
+                    </a:p>
+                    <a:p>
+                      <a:pPr marL="0" indent="0">
+                        <a:buNone/>
+                      </a:pPr>
+                      <a:r>
+                        <a:rPr lang="pt-BR" sz="3200" b="0" dirty="0">
+                          <a:solidFill>
+                            <a:schemeClr val="tx1"/>
+                          </a:solidFill>
+                        </a:rPr>
+                        <a:t>senão</a:t>
+                      </a:r>
+                    </a:p>
+                    <a:p>
+                      <a:pPr marL="0" indent="0">
+                        <a:buNone/>
+                      </a:pPr>
+                      <a:r>
+                        <a:rPr lang="pt-BR" sz="3200" b="0" dirty="0">
+                          <a:solidFill>
+                            <a:schemeClr val="tx1"/>
+                          </a:solidFill>
+                        </a:rPr>
+                        <a:t>	&lt;código&gt;</a:t>
+                      </a:r>
+                    </a:p>
+                    <a:p>
+                      <a:pPr marL="0" indent="0">
+                        <a:buNone/>
+                      </a:pPr>
+                      <a:r>
+                        <a:rPr lang="pt-BR" sz="3200" b="0" dirty="0" err="1">
+                          <a:solidFill>
+                            <a:schemeClr val="tx1"/>
+                          </a:solidFill>
+                        </a:rPr>
+                        <a:t>fim-se</a:t>
+                      </a:r>
+                      <a:endParaRPr lang="pt-BR" sz="3200" b="0" dirty="0">
+                        <a:solidFill>
+                          <a:schemeClr val="tx1"/>
+                        </a:solidFill>
+                      </a:endParaRPr>
+                    </a:p>
+                  </a:txBody>
+                  <a:tcPr>
+                    <a:noFill/>
+                  </a:tcPr>
+                </a:tc>
+                <a:extLst>
+                  <a:ext uri="{0D108BD9-81ED-4DB2-BD59-A6C34878D82A}">
+                    <a16:rowId xmlns:a16="http://schemas.microsoft.com/office/drawing/2014/main" val="45720287"/>
+                  </a:ext>
+                </a:extLst>
+              </a:tr>
+            </a:tbl>
+          </a:graphicData>
+        </a:graphic>
+      </p:graphicFrame>
     </p:spTree>
     <p:extLst>
       <p:ext uri="{BB962C8B-B14F-4D97-AF65-F5344CB8AC3E}">

</xml_diff>

<commit_message>
ex de vetor adicionado na revisão closes #17
</commit_message>
<xml_diff>
--- a/1º semestre/Revisões by danny/Revisão de  algoritmos.pptx
+++ b/1º semestre/Revisões by danny/Revisão de  algoritmos.pptx
@@ -18,9 +18,11 @@
     <p:sldId id="266" r:id="rId12"/>
     <p:sldId id="267" r:id="rId13"/>
     <p:sldId id="268" r:id="rId14"/>
-    <p:sldId id="269" r:id="rId15"/>
-    <p:sldId id="270" r:id="rId16"/>
-    <p:sldId id="271" r:id="rId17"/>
+    <p:sldId id="272" r:id="rId15"/>
+    <p:sldId id="273" r:id="rId16"/>
+    <p:sldId id="269" r:id="rId17"/>
+    <p:sldId id="270" r:id="rId18"/>
+    <p:sldId id="271" r:id="rId19"/>
   </p:sldIdLst>
   <p:sldSz cx="12192000" cy="6858000"/>
   <p:notesSz cx="6858000" cy="9144000"/>
@@ -3765,7 +3767,7 @@
           <p:cNvPr id="2" name="Título 1">
             <a:extLst>
               <a:ext uri="{FF2B5EF4-FFF2-40B4-BE49-F238E27FC236}">
-                <a16:creationId xmlns:a16="http://schemas.microsoft.com/office/drawing/2014/main" id="{2788D7E3-8449-4FA9-81C4-6C0655E41699}"/>
+                <a16:creationId xmlns:a16="http://schemas.microsoft.com/office/drawing/2014/main" id="{172FF120-3ADA-4F09-AD1E-947B313997DA}"/>
               </a:ext>
             </a:extLst>
           </p:cNvPr>
@@ -3776,14 +3778,26 @@
             <p:ph type="title"/>
           </p:nvPr>
         </p:nvSpPr>
-        <p:spPr/>
+        <p:spPr>
+          <a:xfrm>
+            <a:off x="838200" y="365125"/>
+            <a:ext cx="10515600" cy="1573403"/>
+          </a:xfrm>
+        </p:spPr>
         <p:txBody>
           <a:bodyPr/>
           <a:lstStyle/>
           <a:p>
             <a:r>
               <a:rPr lang="pt-BR" dirty="0"/>
-              <a:t>IDENTAÇÃO!</a:t>
+              <a:t>Declaração de um vetor</a:t>
+            </a:r>
+            <a:br>
+              <a:rPr lang="pt-BR" dirty="0"/>
+            </a:br>
+            <a:r>
+              <a:rPr lang="pt-BR" dirty="0"/>
+              <a:t>em pseudocodigo</a:t>
             </a:r>
           </a:p>
         </p:txBody>
@@ -3793,7 +3807,7 @@
           <p:cNvPr id="3" name="Espaço Reservado para Conteúdo 2">
             <a:extLst>
               <a:ext uri="{FF2B5EF4-FFF2-40B4-BE49-F238E27FC236}">
-                <a16:creationId xmlns:a16="http://schemas.microsoft.com/office/drawing/2014/main" id="{7AC19A90-A1CE-4273-B41D-0F1A9F98AFA8}"/>
+                <a16:creationId xmlns:a16="http://schemas.microsoft.com/office/drawing/2014/main" id="{403A970F-7A3F-4AA2-9E7E-FC5880A33E06}"/>
               </a:ext>
             </a:extLst>
           </p:cNvPr>
@@ -3804,36 +3818,76 @@
             <p:ph idx="1"/>
           </p:nvPr>
         </p:nvSpPr>
-        <p:spPr/>
+        <p:spPr>
+          <a:xfrm>
+            <a:off x="838200" y="2141537"/>
+            <a:ext cx="10515600" cy="4351338"/>
+          </a:xfrm>
+        </p:spPr>
         <p:txBody>
           <a:bodyPr/>
           <a:lstStyle/>
           <a:p>
-            <a:r>
-              <a:rPr lang="pt-BR" dirty="0"/>
-              <a:t>A </a:t>
-            </a:r>
+            <a:pPr marL="0" indent="0">
+              <a:buNone/>
+            </a:pPr>
+            <a:r>
+              <a:rPr lang="pt-BR" dirty="0"/>
+              <a:t>Tipo</a:t>
+            </a:r>
+          </a:p>
+          <a:p>
+            <a:pPr marL="0" indent="0">
+              <a:buNone/>
+            </a:pPr>
             <a:r>
               <a:rPr lang="pt-BR" dirty="0" err="1"/>
-              <a:t>identação</a:t>
-            </a:r>
-            <a:r>
-              <a:rPr lang="pt-BR" dirty="0"/>
-              <a:t> é importante para se ter uma melhor visualização e entendimento do código</a:t>
-            </a:r>
-          </a:p>
-          <a:p>
-            <a:r>
-              <a:rPr lang="pt-BR" dirty="0"/>
-              <a:t>Em algumas linguagens de programação, se a </a:t>
+              <a:t>Vet</a:t>
+            </a:r>
+            <a:r>
+              <a:rPr lang="pt-BR" dirty="0"/>
+              <a:t> &lt;- vetor [1...10] de &lt;tipo&gt;</a:t>
+            </a:r>
+          </a:p>
+          <a:p>
+            <a:pPr marL="0" indent="0">
+              <a:buNone/>
+            </a:pPr>
+            <a:r>
+              <a:rPr lang="pt-BR" dirty="0"/>
+              <a:t>Var vetor : </a:t>
             </a:r>
             <a:r>
               <a:rPr lang="pt-BR" dirty="0" err="1"/>
-              <a:t>identação</a:t>
-            </a:r>
-            <a:r>
-              <a:rPr lang="pt-BR" dirty="0"/>
-              <a:t> for feita incorretamente, o código poderá não apresentar o resultado desejado, ou até mesmo não funcionar</a:t>
+              <a:t>vet</a:t>
+            </a:r>
+            <a:endParaRPr lang="pt-BR" dirty="0"/>
+          </a:p>
+          <a:p>
+            <a:pPr marL="0" indent="0">
+              <a:buNone/>
+            </a:pPr>
+            <a:r>
+              <a:rPr lang="pt-BR" dirty="0"/>
+              <a:t>Início</a:t>
+            </a:r>
+          </a:p>
+          <a:p>
+            <a:pPr marL="0" indent="0">
+              <a:buNone/>
+            </a:pPr>
+            <a:r>
+              <a:rPr lang="pt-BR" dirty="0"/>
+              <a:t>	&lt;código&gt;</a:t>
+            </a:r>
+          </a:p>
+          <a:p>
+            <a:pPr marL="0" indent="0">
+              <a:buNone/>
+            </a:pPr>
+            <a:r>
+              <a:rPr lang="pt-BR" dirty="0"/>
+              <a:t>fim</a:t>
             </a:r>
           </a:p>
         </p:txBody>
@@ -3841,7 +3895,7 @@
     </p:spTree>
     <p:extLst>
       <p:ext uri="{BB962C8B-B14F-4D97-AF65-F5344CB8AC3E}">
-        <p14:creationId xmlns:p14="http://schemas.microsoft.com/office/powerpoint/2010/main" val="1049516433"/>
+        <p14:creationId xmlns:p14="http://schemas.microsoft.com/office/powerpoint/2010/main" val="512553494"/>
       </p:ext>
     </p:extLst>
   </p:cSld>
@@ -3870,6 +3924,315 @@
       </p:grpSpPr>
       <p:sp>
         <p:nvSpPr>
+          <p:cNvPr id="2" name="Título 1">
+            <a:extLst>
+              <a:ext uri="{FF2B5EF4-FFF2-40B4-BE49-F238E27FC236}">
+                <a16:creationId xmlns:a16="http://schemas.microsoft.com/office/drawing/2014/main" id="{A5EE7C70-A660-441D-8B5F-01CE6FDA0613}"/>
+              </a:ext>
+            </a:extLst>
+          </p:cNvPr>
+          <p:cNvSpPr>
+            <a:spLocks noGrp="1"/>
+          </p:cNvSpPr>
+          <p:nvPr>
+            <p:ph type="title"/>
+          </p:nvPr>
+        </p:nvSpPr>
+        <p:spPr/>
+        <p:txBody>
+          <a:bodyPr/>
+          <a:lstStyle/>
+          <a:p>
+            <a:r>
+              <a:rPr lang="pt-BR" dirty="0"/>
+              <a:t>Percorrendo um vetor</a:t>
+            </a:r>
+          </a:p>
+        </p:txBody>
+      </p:sp>
+      <p:sp>
+        <p:nvSpPr>
+          <p:cNvPr id="3" name="Espaço Reservado para Conteúdo 2">
+            <a:extLst>
+              <a:ext uri="{FF2B5EF4-FFF2-40B4-BE49-F238E27FC236}">
+                <a16:creationId xmlns:a16="http://schemas.microsoft.com/office/drawing/2014/main" id="{EC664884-F6C1-4C19-A465-3D4E515A9C35}"/>
+              </a:ext>
+            </a:extLst>
+          </p:cNvPr>
+          <p:cNvSpPr>
+            <a:spLocks noGrp="1"/>
+          </p:cNvSpPr>
+          <p:nvPr>
+            <p:ph idx="1"/>
+          </p:nvPr>
+        </p:nvSpPr>
+        <p:spPr>
+          <a:xfrm>
+            <a:off x="838200" y="1825625"/>
+            <a:ext cx="10515600" cy="4667250"/>
+          </a:xfrm>
+        </p:spPr>
+        <p:txBody>
+          <a:bodyPr>
+            <a:normAutofit/>
+          </a:bodyPr>
+          <a:lstStyle/>
+          <a:p>
+            <a:pPr marL="0" indent="0">
+              <a:buNone/>
+            </a:pPr>
+            <a:r>
+              <a:rPr lang="pt-BR" dirty="0"/>
+              <a:t>Tipo</a:t>
+            </a:r>
+          </a:p>
+          <a:p>
+            <a:pPr marL="0" indent="0">
+              <a:buNone/>
+            </a:pPr>
+            <a:r>
+              <a:rPr lang="pt-BR" dirty="0" err="1"/>
+              <a:t>Vet</a:t>
+            </a:r>
+            <a:r>
+              <a:rPr lang="pt-BR" dirty="0"/>
+              <a:t> &lt;- vetor [1...10] de &lt;tipo&gt;</a:t>
+            </a:r>
+          </a:p>
+          <a:p>
+            <a:pPr marL="0" indent="0">
+              <a:buNone/>
+            </a:pPr>
+            <a:r>
+              <a:rPr lang="pt-BR" dirty="0"/>
+              <a:t>Var vetor : </a:t>
+            </a:r>
+            <a:r>
+              <a:rPr lang="pt-BR" dirty="0" err="1"/>
+              <a:t>vet</a:t>
+            </a:r>
+            <a:endParaRPr lang="pt-BR" dirty="0"/>
+          </a:p>
+          <a:p>
+            <a:pPr marL="0" indent="0">
+              <a:buNone/>
+            </a:pPr>
+            <a:r>
+              <a:rPr lang="pt-BR" dirty="0"/>
+              <a:t>Início</a:t>
+            </a:r>
+          </a:p>
+          <a:p>
+            <a:pPr marL="0" indent="0">
+              <a:buNone/>
+            </a:pPr>
+            <a:r>
+              <a:rPr lang="pt-BR" dirty="0"/>
+              <a:t>	Para </a:t>
+            </a:r>
+            <a:r>
+              <a:rPr lang="pt-BR" dirty="0" err="1"/>
+              <a:t>cont</a:t>
+            </a:r>
+            <a:r>
+              <a:rPr lang="pt-BR" dirty="0"/>
+              <a:t> de 1 até 10 faça:</a:t>
+            </a:r>
+          </a:p>
+          <a:p>
+            <a:pPr marL="0" indent="0">
+              <a:buNone/>
+            </a:pPr>
+            <a:r>
+              <a:rPr lang="pt-BR" dirty="0"/>
+              <a:t>		escreva(‘digite um número’)</a:t>
+            </a:r>
+          </a:p>
+          <a:p>
+            <a:pPr marL="0" indent="0">
+              <a:buNone/>
+            </a:pPr>
+            <a:r>
+              <a:rPr lang="pt-BR" dirty="0"/>
+              <a:t>		leia(</a:t>
+            </a:r>
+            <a:r>
+              <a:rPr lang="pt-BR" dirty="0" err="1"/>
+              <a:t>vet</a:t>
+            </a:r>
+            <a:r>
+              <a:rPr lang="pt-BR" dirty="0"/>
+              <a:t>[</a:t>
+            </a:r>
+            <a:r>
+              <a:rPr lang="pt-BR" dirty="0" err="1"/>
+              <a:t>cont</a:t>
+            </a:r>
+            <a:r>
+              <a:rPr lang="pt-BR" dirty="0"/>
+              <a:t>])</a:t>
+            </a:r>
+          </a:p>
+          <a:p>
+            <a:pPr marL="0" indent="0">
+              <a:buNone/>
+            </a:pPr>
+            <a:r>
+              <a:rPr lang="pt-BR" dirty="0"/>
+              <a:t>	Fim-para</a:t>
+            </a:r>
+          </a:p>
+          <a:p>
+            <a:pPr marL="0" indent="0">
+              <a:buNone/>
+            </a:pPr>
+            <a:r>
+              <a:rPr lang="pt-BR" dirty="0"/>
+              <a:t>fim</a:t>
+            </a:r>
+          </a:p>
+        </p:txBody>
+      </p:sp>
+    </p:spTree>
+    <p:extLst>
+      <p:ext uri="{BB962C8B-B14F-4D97-AF65-F5344CB8AC3E}">
+        <p14:creationId xmlns:p14="http://schemas.microsoft.com/office/powerpoint/2010/main" val="2590450735"/>
+      </p:ext>
+    </p:extLst>
+  </p:cSld>
+  <p:clrMapOvr>
+    <a:masterClrMapping/>
+  </p:clrMapOvr>
+</p:sld>
+</file>
+
+<file path=ppt/slides/slide16.xml><?xml version="1.0" encoding="utf-8"?>
+<p:sld xmlns:a="http://schemas.openxmlformats.org/drawingml/2006/main" xmlns:r="http://schemas.openxmlformats.org/officeDocument/2006/relationships" xmlns:p="http://schemas.openxmlformats.org/presentationml/2006/main">
+  <p:cSld>
+    <p:spTree>
+      <p:nvGrpSpPr>
+        <p:cNvPr id="1" name=""/>
+        <p:cNvGrpSpPr/>
+        <p:nvPr/>
+      </p:nvGrpSpPr>
+      <p:grpSpPr>
+        <a:xfrm>
+          <a:off x="0" y="0"/>
+          <a:ext cx="0" cy="0"/>
+          <a:chOff x="0" y="0"/>
+          <a:chExt cx="0" cy="0"/>
+        </a:xfrm>
+      </p:grpSpPr>
+      <p:sp>
+        <p:nvSpPr>
+          <p:cNvPr id="2" name="Título 1">
+            <a:extLst>
+              <a:ext uri="{FF2B5EF4-FFF2-40B4-BE49-F238E27FC236}">
+                <a16:creationId xmlns:a16="http://schemas.microsoft.com/office/drawing/2014/main" id="{2788D7E3-8449-4FA9-81C4-6C0655E41699}"/>
+              </a:ext>
+            </a:extLst>
+          </p:cNvPr>
+          <p:cNvSpPr>
+            <a:spLocks noGrp="1"/>
+          </p:cNvSpPr>
+          <p:nvPr>
+            <p:ph type="title"/>
+          </p:nvPr>
+        </p:nvSpPr>
+        <p:spPr/>
+        <p:txBody>
+          <a:bodyPr/>
+          <a:lstStyle/>
+          <a:p>
+            <a:r>
+              <a:rPr lang="pt-BR" dirty="0"/>
+              <a:t>IDENTAÇÃO!</a:t>
+            </a:r>
+          </a:p>
+        </p:txBody>
+      </p:sp>
+      <p:sp>
+        <p:nvSpPr>
+          <p:cNvPr id="3" name="Espaço Reservado para Conteúdo 2">
+            <a:extLst>
+              <a:ext uri="{FF2B5EF4-FFF2-40B4-BE49-F238E27FC236}">
+                <a16:creationId xmlns:a16="http://schemas.microsoft.com/office/drawing/2014/main" id="{7AC19A90-A1CE-4273-B41D-0F1A9F98AFA8}"/>
+              </a:ext>
+            </a:extLst>
+          </p:cNvPr>
+          <p:cNvSpPr>
+            <a:spLocks noGrp="1"/>
+          </p:cNvSpPr>
+          <p:nvPr>
+            <p:ph idx="1"/>
+          </p:nvPr>
+        </p:nvSpPr>
+        <p:spPr/>
+        <p:txBody>
+          <a:bodyPr/>
+          <a:lstStyle/>
+          <a:p>
+            <a:r>
+              <a:rPr lang="pt-BR" dirty="0"/>
+              <a:t>A </a:t>
+            </a:r>
+            <a:r>
+              <a:rPr lang="pt-BR" dirty="0" err="1"/>
+              <a:t>identação</a:t>
+            </a:r>
+            <a:r>
+              <a:rPr lang="pt-BR" dirty="0"/>
+              <a:t> é importante para se ter uma melhor visualização e entendimento do código</a:t>
+            </a:r>
+          </a:p>
+          <a:p>
+            <a:r>
+              <a:rPr lang="pt-BR" dirty="0"/>
+              <a:t>Em algumas linguagens de programação, se a </a:t>
+            </a:r>
+            <a:r>
+              <a:rPr lang="pt-BR" dirty="0" err="1"/>
+              <a:t>identação</a:t>
+            </a:r>
+            <a:r>
+              <a:rPr lang="pt-BR" dirty="0"/>
+              <a:t> for feita incorretamente, o código poderá não apresentar o resultado desejado, ou até mesmo não funcionar</a:t>
+            </a:r>
+          </a:p>
+        </p:txBody>
+      </p:sp>
+    </p:spTree>
+    <p:extLst>
+      <p:ext uri="{BB962C8B-B14F-4D97-AF65-F5344CB8AC3E}">
+        <p14:creationId xmlns:p14="http://schemas.microsoft.com/office/powerpoint/2010/main" val="1049516433"/>
+      </p:ext>
+    </p:extLst>
+  </p:cSld>
+  <p:clrMapOvr>
+    <a:masterClrMapping/>
+  </p:clrMapOvr>
+</p:sld>
+</file>
+
+<file path=ppt/slides/slide17.xml><?xml version="1.0" encoding="utf-8"?>
+<p:sld xmlns:a="http://schemas.openxmlformats.org/drawingml/2006/main" xmlns:r="http://schemas.openxmlformats.org/officeDocument/2006/relationships" xmlns:p="http://schemas.openxmlformats.org/presentationml/2006/main">
+  <p:cSld>
+    <p:spTree>
+      <p:nvGrpSpPr>
+        <p:cNvPr id="1" name=""/>
+        <p:cNvGrpSpPr/>
+        <p:nvPr/>
+      </p:nvGrpSpPr>
+      <p:grpSpPr>
+        <a:xfrm>
+          <a:off x="0" y="0"/>
+          <a:ext cx="0" cy="0"/>
+          <a:chOff x="0" y="0"/>
+          <a:chExt cx="0" cy="0"/>
+        </a:xfrm>
+      </p:grpSpPr>
+      <p:sp>
+        <p:nvSpPr>
           <p:cNvPr id="3" name="Espaço Reservado para Conteúdo 2">
             <a:extLst>
               <a:ext uri="{FF2B5EF4-FFF2-40B4-BE49-F238E27FC236}">
@@ -4478,7 +4841,7 @@
 </p:sld>
 </file>
 
-<file path=ppt/slides/slide16.xml><?xml version="1.0" encoding="utf-8"?>
+<file path=ppt/slides/slide18.xml><?xml version="1.0" encoding="utf-8"?>
 <p:sld xmlns:a="http://schemas.openxmlformats.org/drawingml/2006/main" xmlns:r="http://schemas.openxmlformats.org/officeDocument/2006/relationships" xmlns:p="http://schemas.openxmlformats.org/presentationml/2006/main">
   <p:cSld>
     <p:spTree>

</xml_diff>